<commit_message>
iOS and Gsuit Comments
Added a slide for iOS and Google Doc.
</commit_message>
<xml_diff>
--- a/Tips & Tricks Presentation Slides.pptx
+++ b/Tips & Tricks Presentation Slides.pptx
@@ -5,7 +5,7 @@
     <p:sldMasterId id="2147483839" r:id="rId1"/>
   </p:sldMasterIdLst>
   <p:handoutMasterIdLst>
-    <p:handoutMasterId r:id="rId32"/>
+    <p:handoutMasterId r:id="rId33"/>
   </p:handoutMasterIdLst>
   <p:sldIdLst>
     <p:sldId id="256" r:id="rId2"/>
@@ -34,10 +34,11 @@
     <p:sldId id="281" r:id="rId25"/>
     <p:sldId id="282" r:id="rId26"/>
     <p:sldId id="284" r:id="rId27"/>
-    <p:sldId id="279" r:id="rId28"/>
-    <p:sldId id="278" r:id="rId29"/>
-    <p:sldId id="285" r:id="rId30"/>
-    <p:sldId id="286" r:id="rId31"/>
+    <p:sldId id="287" r:id="rId28"/>
+    <p:sldId id="279" r:id="rId29"/>
+    <p:sldId id="278" r:id="rId30"/>
+    <p:sldId id="285" r:id="rId31"/>
+    <p:sldId id="286" r:id="rId32"/>
   </p:sldIdLst>
   <p:sldSz cx="9144000" cy="6858000" type="screen4x3"/>
   <p:notesSz cx="6858000" cy="9144000"/>
@@ -241,7 +242,7 @@
           <a:p>
             <a:fld id="{2507E31C-93C7-4344-A1E5-2CF566EF25CC}" type="datetimeFigureOut">
               <a:rPr lang="en-US" smtClean="0"/>
-              <a:t>2/1/2020</a:t>
+              <a:t>2/5/20</a:t>
             </a:fld>
             <a:endParaRPr lang="en-US"/>
           </a:p>
@@ -467,7 +468,7 @@
           <a:p>
             <a:fld id="{A8638117-B239-4C92-BB2C-D2F0C076990F}" type="datetimeFigureOut">
               <a:rPr lang="en-US" smtClean="0"/>
-              <a:t>2/1/2020</a:t>
+              <a:t>2/5/20</a:t>
             </a:fld>
             <a:endParaRPr lang="en-US"/>
           </a:p>
@@ -637,7 +638,7 @@
           <a:p>
             <a:fld id="{A8638117-B239-4C92-BB2C-D2F0C076990F}" type="datetimeFigureOut">
               <a:rPr lang="en-US" smtClean="0"/>
-              <a:t>2/1/2020</a:t>
+              <a:t>2/5/20</a:t>
             </a:fld>
             <a:endParaRPr lang="en-US"/>
           </a:p>
@@ -817,7 +818,7 @@
           <a:p>
             <a:fld id="{A8638117-B239-4C92-BB2C-D2F0C076990F}" type="datetimeFigureOut">
               <a:rPr lang="en-US" smtClean="0"/>
-              <a:t>2/1/2020</a:t>
+              <a:t>2/5/20</a:t>
             </a:fld>
             <a:endParaRPr lang="en-US"/>
           </a:p>
@@ -987,7 +988,7 @@
           <a:p>
             <a:fld id="{A8638117-B239-4C92-BB2C-D2F0C076990F}" type="datetimeFigureOut">
               <a:rPr lang="en-US" smtClean="0"/>
-              <a:t>2/1/2020</a:t>
+              <a:t>2/5/20</a:t>
             </a:fld>
             <a:endParaRPr lang="en-US"/>
           </a:p>
@@ -1233,7 +1234,7 @@
           <a:p>
             <a:fld id="{A8638117-B239-4C92-BB2C-D2F0C076990F}" type="datetimeFigureOut">
               <a:rPr lang="en-US" smtClean="0"/>
-              <a:t>2/1/2020</a:t>
+              <a:t>2/5/20</a:t>
             </a:fld>
             <a:endParaRPr lang="en-US"/>
           </a:p>
@@ -1465,7 +1466,7 @@
           <a:p>
             <a:fld id="{A8638117-B239-4C92-BB2C-D2F0C076990F}" type="datetimeFigureOut">
               <a:rPr lang="en-US" smtClean="0"/>
-              <a:t>2/1/2020</a:t>
+              <a:t>2/5/20</a:t>
             </a:fld>
             <a:endParaRPr lang="en-US"/>
           </a:p>
@@ -1832,7 +1833,7 @@
           <a:p>
             <a:fld id="{A8638117-B239-4C92-BB2C-D2F0C076990F}" type="datetimeFigureOut">
               <a:rPr lang="en-US" smtClean="0"/>
-              <a:t>2/1/2020</a:t>
+              <a:t>2/5/20</a:t>
             </a:fld>
             <a:endParaRPr lang="en-US"/>
           </a:p>
@@ -1950,7 +1951,7 @@
           <a:p>
             <a:fld id="{A8638117-B239-4C92-BB2C-D2F0C076990F}" type="datetimeFigureOut">
               <a:rPr lang="en-US" smtClean="0"/>
-              <a:t>2/1/2020</a:t>
+              <a:t>2/5/20</a:t>
             </a:fld>
             <a:endParaRPr lang="en-US"/>
           </a:p>
@@ -2045,7 +2046,7 @@
           <a:p>
             <a:fld id="{A8638117-B239-4C92-BB2C-D2F0C076990F}" type="datetimeFigureOut">
               <a:rPr lang="en-US" smtClean="0"/>
-              <a:t>2/1/2020</a:t>
+              <a:t>2/5/20</a:t>
             </a:fld>
             <a:endParaRPr lang="en-US"/>
           </a:p>
@@ -2322,7 +2323,7 @@
           <a:p>
             <a:fld id="{A8638117-B239-4C92-BB2C-D2F0C076990F}" type="datetimeFigureOut">
               <a:rPr lang="en-US" smtClean="0"/>
-              <a:t>2/1/2020</a:t>
+              <a:t>2/5/20</a:t>
             </a:fld>
             <a:endParaRPr lang="en-US"/>
           </a:p>
@@ -2579,7 +2580,7 @@
           <a:p>
             <a:fld id="{A8638117-B239-4C92-BB2C-D2F0C076990F}" type="datetimeFigureOut">
               <a:rPr lang="en-US" smtClean="0"/>
-              <a:t>2/1/2020</a:t>
+              <a:t>2/5/20</a:t>
             </a:fld>
             <a:endParaRPr lang="en-US"/>
           </a:p>
@@ -2818,7 +2819,7 @@
           <a:p>
             <a:fld id="{A8638117-B239-4C92-BB2C-D2F0C076990F}" type="datetimeFigureOut">
               <a:rPr lang="en-US" smtClean="0"/>
-              <a:t>2/1/2020</a:t>
+              <a:t>2/5/20</a:t>
             </a:fld>
             <a:endParaRPr lang="en-US"/>
           </a:p>
@@ -10331,7 +10332,15 @@
             <a:pPr lvl="1"/>
             <a:r>
               <a:rPr lang="en-US" dirty="0"/>
-              <a:t>Producing documents in MS Office applications (Windows and Mac)</a:t>
+              <a:t>Producing documents in </a:t>
+            </a:r>
+            <a:r>
+              <a:rPr lang="en-US" u="sng" dirty="0"/>
+              <a:t>MS Office </a:t>
+            </a:r>
+            <a:r>
+              <a:rPr lang="en-US" dirty="0"/>
+              <a:t>applications (Windows and Mac)</a:t>
             </a:r>
           </a:p>
           <a:p>
@@ -10373,7 +10382,7 @@
             <a:pPr lvl="1"/>
             <a:r>
               <a:rPr lang="en-US" dirty="0"/>
-              <a:t>Launching pad for typing equations in other environments (e.g. Titanium) or applications (LaTeX scripts, </a:t>
+              <a:t>Launching pad for typing equations in other environments (e.g. Titanium) or applications (</a:t>
             </a:r>
             <a:r>
               <a:rPr lang="en-US" dirty="0" err="1"/>
@@ -10389,7 +10398,7 @@
             </a:r>
             <a:r>
               <a:rPr lang="en-US" dirty="0"/>
-              <a:t>, MATLAB’s Live Script, …)</a:t>
+              <a:t>, MATLAB’s Live Script, iOS Pages, …)</a:t>
             </a:r>
           </a:p>
         </p:txBody>
@@ -14685,7 +14694,11 @@
                   <a:schemeClr val="accent1"/>
                 </a:solidFill>
               </a:rPr>
-              <a:t> (</a:t>
+              <a:t> … (</a:t>
+            </a:r>
+            <a:r>
+              <a:rPr lang="en-US" dirty="0"/>
+              <a:t>in Mac </a:t>
             </a:r>
             <a:r>
               <a:rPr lang="en-US" u="sng" dirty="0">
@@ -14728,7 +14741,11 @@
                   <a:schemeClr val="accent1"/>
                 </a:solidFill>
               </a:rPr>
-              <a:t> (</a:t>
+              <a:t> … (</a:t>
+            </a:r>
+            <a:r>
+              <a:rPr lang="en-US" dirty="0"/>
+              <a:t>in Mac </a:t>
             </a:r>
             <a:r>
               <a:rPr lang="en-US" u="sng" dirty="0">
@@ -14769,34 +14786,6 @@
                 </a:solidFill>
               </a:rPr>
               <a:t>[space]</a:t>
-            </a:r>
-            <a:r>
-              <a:rPr lang="en-US" dirty="0"/>
-              <a:t> or </a:t>
-            </a:r>
-            <a:r>
-              <a:rPr lang="en-US" dirty="0">
-                <a:solidFill>
-                  <a:schemeClr val="accent1"/>
-                </a:solidFill>
-              </a:rPr>
-              <a:t>$$...$$</a:t>
-            </a:r>
-            <a:r>
-              <a:rPr lang="en-US" u="sng" dirty="0">
-                <a:solidFill>
-                  <a:schemeClr val="accent1"/>
-                </a:solidFill>
-              </a:rPr>
-              <a:t>[space]</a:t>
-            </a:r>
-            <a:r>
-              <a:rPr lang="en-US" dirty="0">
-                <a:solidFill>
-                  <a:schemeClr val="accent1"/>
-                </a:solidFill>
-              </a:rPr>
-              <a:t> </a:t>
             </a:r>
             <a:endParaRPr lang="en-US" dirty="0">
               <a:latin typeface="Arial Black" panose="020B0A04020102020204" pitchFamily="34" charset="0"/>
@@ -14881,6 +14870,183 @@
           <p:cNvPr id="2" name="Title 1">
             <a:extLst>
               <a:ext uri="{FF2B5EF4-FFF2-40B4-BE49-F238E27FC236}">
+                <a16:creationId xmlns:a16="http://schemas.microsoft.com/office/drawing/2014/main" id="{C0CDC325-E522-224C-B392-10C87AAF2BC5}"/>
+              </a:ext>
+            </a:extLst>
+          </p:cNvPr>
+          <p:cNvSpPr>
+            <a:spLocks noGrp="1"/>
+          </p:cNvSpPr>
+          <p:nvPr>
+            <p:ph type="title"/>
+          </p:nvPr>
+        </p:nvSpPr>
+        <p:spPr/>
+        <p:txBody>
+          <a:bodyPr/>
+          <a:lstStyle/>
+          <a:p>
+            <a:r>
+              <a:rPr lang="en-US" dirty="0"/>
+              <a:t>Extending Your Skills – In Other Applications</a:t>
+            </a:r>
+          </a:p>
+        </p:txBody>
+      </p:sp>
+      <p:sp>
+        <p:nvSpPr>
+          <p:cNvPr id="3" name="Content Placeholder 2">
+            <a:extLst>
+              <a:ext uri="{FF2B5EF4-FFF2-40B4-BE49-F238E27FC236}">
+                <a16:creationId xmlns:a16="http://schemas.microsoft.com/office/drawing/2014/main" id="{1B0E565B-4FF6-1C42-A432-63A15ABDB93D}"/>
+              </a:ext>
+            </a:extLst>
+          </p:cNvPr>
+          <p:cNvSpPr>
+            <a:spLocks noGrp="1"/>
+          </p:cNvSpPr>
+          <p:nvPr>
+            <p:ph idx="1"/>
+          </p:nvPr>
+        </p:nvSpPr>
+        <p:spPr/>
+        <p:txBody>
+          <a:bodyPr/>
+          <a:lstStyle/>
+          <a:p>
+            <a:r>
+              <a:rPr lang="en-US" dirty="0"/>
+              <a:t>LaTeX in iOS Pages, Keynote or Numbers: </a:t>
+            </a:r>
+          </a:p>
+          <a:p>
+            <a:pPr lvl="1"/>
+            <a:r>
+              <a:rPr lang="en-US" dirty="0"/>
+              <a:t>Start with </a:t>
+            </a:r>
+            <a:r>
+              <a:rPr lang="en-US" u="sng" dirty="0">
+                <a:solidFill>
+                  <a:schemeClr val="accent1"/>
+                </a:solidFill>
+              </a:rPr>
+              <a:t>[Alt]⌘E</a:t>
+            </a:r>
+          </a:p>
+          <a:p>
+            <a:pPr lvl="1"/>
+            <a:r>
+              <a:rPr lang="en-US" dirty="0"/>
+              <a:t>Type LaTeX in a GUI</a:t>
+            </a:r>
+          </a:p>
+          <a:p>
+            <a:pPr lvl="1"/>
+            <a:r>
+              <a:rPr lang="en-US" dirty="0"/>
+              <a:t>Stop by </a:t>
+            </a:r>
+            <a:r>
+              <a:rPr lang="en-US" u="sng" dirty="0">
+                <a:solidFill>
+                  <a:schemeClr val="accent1"/>
+                </a:solidFill>
+              </a:rPr>
+              <a:t>⌘ [Enter]</a:t>
+            </a:r>
+          </a:p>
+          <a:p>
+            <a:endParaRPr lang="en-US" dirty="0"/>
+          </a:p>
+          <a:p>
+            <a:r>
+              <a:rPr lang="en-US" dirty="0"/>
+              <a:t>Equations in Google Doc:</a:t>
+            </a:r>
+          </a:p>
+          <a:p>
+            <a:pPr lvl="1"/>
+            <a:r>
+              <a:rPr lang="en-US" dirty="0"/>
+              <a:t>Insert&gt;Equation</a:t>
+            </a:r>
+          </a:p>
+          <a:p>
+            <a:pPr lvl="1"/>
+            <a:endParaRPr lang="en-US" dirty="0"/>
+          </a:p>
+          <a:p>
+            <a:r>
+              <a:rPr lang="en-US" dirty="0"/>
+              <a:t>LaTeX in Google Doc:</a:t>
+            </a:r>
+          </a:p>
+          <a:p>
+            <a:pPr lvl="1"/>
+            <a:r>
+              <a:rPr lang="en-US" dirty="0"/>
+              <a:t>Install Add-ons (e.g. Equation Editor ++)</a:t>
+            </a:r>
+          </a:p>
+          <a:p>
+            <a:pPr lvl="1"/>
+            <a:endParaRPr lang="en-US" dirty="0"/>
+          </a:p>
+          <a:p>
+            <a:pPr marL="0" indent="0">
+              <a:buNone/>
+            </a:pPr>
+            <a:r>
+              <a:rPr lang="en-US" dirty="0"/>
+              <a:t>NOTE: LaTeX commands could be limited. In </a:t>
+            </a:r>
+            <a:r>
+              <a:rPr lang="en-US" dirty="0" err="1"/>
+              <a:t>Rmarkdown</a:t>
+            </a:r>
+            <a:r>
+              <a:rPr lang="en-US" dirty="0"/>
+              <a:t>, or LaTeX scripting applications, commands can be extended by adding packages.</a:t>
+            </a:r>
+          </a:p>
+        </p:txBody>
+      </p:sp>
+    </p:spTree>
+    <p:extLst>
+      <p:ext uri="{BB962C8B-B14F-4D97-AF65-F5344CB8AC3E}">
+        <p14:creationId xmlns:p14="http://schemas.microsoft.com/office/powerpoint/2010/main" val="1419753288"/>
+      </p:ext>
+    </p:extLst>
+  </p:cSld>
+  <p:clrMapOvr>
+    <a:masterClrMapping/>
+  </p:clrMapOvr>
+</p:sld>
+</file>
+
+<file path=ppt/slides/slide28.xml><?xml version="1.0" encoding="utf-8"?>
+<p:sld xmlns:a="http://schemas.openxmlformats.org/drawingml/2006/main" xmlns:r="http://schemas.openxmlformats.org/officeDocument/2006/relationships" xmlns:p="http://schemas.openxmlformats.org/presentationml/2006/main">
+  <p:cSld>
+    <p:spTree>
+      <p:nvGrpSpPr>
+        <p:cNvPr id="1" name=""/>
+        <p:cNvGrpSpPr/>
+        <p:nvPr/>
+      </p:nvGrpSpPr>
+      <p:grpSpPr>
+        <a:xfrm>
+          <a:off x="0" y="0"/>
+          <a:ext cx="0" cy="0"/>
+          <a:chOff x="0" y="0"/>
+          <a:chExt cx="0" cy="0"/>
+        </a:xfrm>
+      </p:grpSpPr>
+      <p:sp>
+        <p:nvSpPr>
+          <p:cNvPr id="2" name="Title 1">
+            <a:extLst>
+              <a:ext uri="{FF2B5EF4-FFF2-40B4-BE49-F238E27FC236}">
                 <a16:creationId xmlns:a16="http://schemas.microsoft.com/office/drawing/2014/main" id="{5240FF53-87C8-4AC2-ACA9-FAF9B534587A}"/>
               </a:ext>
             </a:extLst>
@@ -15074,7 +15240,7 @@
 </p:sld>
 </file>
 
-<file path=ppt/slides/slide28.xml><?xml version="1.0" encoding="utf-8"?>
+<file path=ppt/slides/slide29.xml><?xml version="1.0" encoding="utf-8"?>
 <p:sld xmlns:a="http://schemas.openxmlformats.org/drawingml/2006/main" xmlns:r="http://schemas.openxmlformats.org/officeDocument/2006/relationships" xmlns:p="http://schemas.openxmlformats.org/presentationml/2006/main">
   <p:cSld>
     <p:spTree>
@@ -15724,7 +15890,181 @@
 </p:sld>
 </file>
 
-<file path=ppt/slides/slide29.xml><?xml version="1.0" encoding="utf-8"?>
+<file path=ppt/slides/slide3.xml><?xml version="1.0" encoding="utf-8"?>
+<p:sld xmlns:a="http://schemas.openxmlformats.org/drawingml/2006/main" xmlns:r="http://schemas.openxmlformats.org/officeDocument/2006/relationships" xmlns:p="http://schemas.openxmlformats.org/presentationml/2006/main">
+  <p:cSld>
+    <p:spTree>
+      <p:nvGrpSpPr>
+        <p:cNvPr id="1" name=""/>
+        <p:cNvGrpSpPr/>
+        <p:nvPr/>
+      </p:nvGrpSpPr>
+      <p:grpSpPr>
+        <a:xfrm>
+          <a:off x="0" y="0"/>
+          <a:ext cx="0" cy="0"/>
+          <a:chOff x="0" y="0"/>
+          <a:chExt cx="0" cy="0"/>
+        </a:xfrm>
+      </p:grpSpPr>
+      <p:sp>
+        <p:nvSpPr>
+          <p:cNvPr id="2" name="Title 1">
+            <a:extLst>
+              <a:ext uri="{FF2B5EF4-FFF2-40B4-BE49-F238E27FC236}">
+                <a16:creationId xmlns:a16="http://schemas.microsoft.com/office/drawing/2014/main" id="{37E876F8-067E-4EB9-BF49-F89978AAAAD0}"/>
+              </a:ext>
+            </a:extLst>
+          </p:cNvPr>
+          <p:cNvSpPr>
+            <a:spLocks noGrp="1"/>
+          </p:cNvSpPr>
+          <p:nvPr>
+            <p:ph type="title"/>
+          </p:nvPr>
+        </p:nvSpPr>
+        <p:spPr/>
+        <p:txBody>
+          <a:bodyPr/>
+          <a:lstStyle/>
+          <a:p>
+            <a:r>
+              <a:rPr lang="en-US" dirty="0"/>
+              <a:t>Content</a:t>
+            </a:r>
+          </a:p>
+        </p:txBody>
+      </p:sp>
+      <p:sp>
+        <p:nvSpPr>
+          <p:cNvPr id="3" name="Content Placeholder 2">
+            <a:extLst>
+              <a:ext uri="{FF2B5EF4-FFF2-40B4-BE49-F238E27FC236}">
+                <a16:creationId xmlns:a16="http://schemas.microsoft.com/office/drawing/2014/main" id="{1FF33A90-9C08-41D6-9E78-06E1318D0C4A}"/>
+              </a:ext>
+            </a:extLst>
+          </p:cNvPr>
+          <p:cNvSpPr>
+            <a:spLocks noGrp="1"/>
+          </p:cNvSpPr>
+          <p:nvPr>
+            <p:ph idx="1"/>
+          </p:nvPr>
+        </p:nvSpPr>
+        <p:spPr>
+          <a:xfrm>
+            <a:off x="628650" y="1825625"/>
+            <a:ext cx="7886700" cy="4506936"/>
+          </a:xfrm>
+        </p:spPr>
+        <p:txBody>
+          <a:bodyPr>
+            <a:normAutofit/>
+          </a:bodyPr>
+          <a:lstStyle/>
+          <a:p>
+            <a:pPr>
+              <a:lnSpc>
+                <a:spcPct val="130000"/>
+              </a:lnSpc>
+              <a:spcAft>
+                <a:spcPts val="200"/>
+              </a:spcAft>
+            </a:pPr>
+            <a:r>
+              <a:rPr lang="en-US" dirty="0"/>
+              <a:t>Adding Equations</a:t>
+            </a:r>
+          </a:p>
+          <a:p>
+            <a:pPr lvl="1"/>
+            <a:r>
+              <a:rPr lang="en-US" dirty="0"/>
+              <a:t>Image vs. Equation Editor</a:t>
+            </a:r>
+          </a:p>
+          <a:p>
+            <a:pPr lvl="1"/>
+            <a:r>
+              <a:rPr lang="en-US" dirty="0"/>
+              <a:t>Equation Editor: Point &amp; Click vs. Keyboard</a:t>
+            </a:r>
+          </a:p>
+          <a:p>
+            <a:r>
+              <a:rPr lang="en-US" dirty="0"/>
+              <a:t>Getting Started</a:t>
+            </a:r>
+          </a:p>
+          <a:p>
+            <a:pPr lvl="1"/>
+            <a:r>
+              <a:rPr lang="en-US" dirty="0"/>
+              <a:t>One more thing: Notations</a:t>
+            </a:r>
+          </a:p>
+          <a:p>
+            <a:pPr lvl="1"/>
+            <a:r>
+              <a:rPr lang="en-US" dirty="0"/>
+              <a:t>Let’s Do it</a:t>
+            </a:r>
+          </a:p>
+          <a:p>
+            <a:r>
+              <a:rPr lang="en-US" dirty="0"/>
+              <a:t>Formatting Equations</a:t>
+            </a:r>
+          </a:p>
+          <a:p>
+            <a:pPr lvl="1"/>
+            <a:r>
+              <a:rPr lang="en-US" dirty="0"/>
+              <a:t>Inline vs. Display</a:t>
+            </a:r>
+          </a:p>
+          <a:p>
+            <a:pPr lvl="1"/>
+            <a:r>
+              <a:rPr lang="en-US" dirty="0"/>
+              <a:t>Adding Space (Horizontal/Vertical) </a:t>
+            </a:r>
+          </a:p>
+          <a:p>
+            <a:pPr lvl="1"/>
+            <a:r>
+              <a:rPr lang="en-US" dirty="0"/>
+              <a:t>Align Equations</a:t>
+            </a:r>
+          </a:p>
+          <a:p>
+            <a:r>
+              <a:rPr lang="en-US" dirty="0"/>
+              <a:t>Referencing Equations</a:t>
+            </a:r>
+          </a:p>
+          <a:p>
+            <a:r>
+              <a:rPr lang="en-US" dirty="0"/>
+              <a:t>Extending your skills</a:t>
+            </a:r>
+          </a:p>
+        </p:txBody>
+      </p:sp>
+    </p:spTree>
+    <p:extLst>
+      <p:ext uri="{BB962C8B-B14F-4D97-AF65-F5344CB8AC3E}">
+        <p14:creationId xmlns:p14="http://schemas.microsoft.com/office/powerpoint/2010/main" val="2606373630"/>
+      </p:ext>
+    </p:extLst>
+  </p:cSld>
+  <p:clrMapOvr>
+    <a:masterClrMapping/>
+  </p:clrMapOvr>
+</p:sld>
+</file>
+
+<file path=ppt/slides/slide30.xml><?xml version="1.0" encoding="utf-8"?>
 <p:sld xmlns:a="http://schemas.openxmlformats.org/drawingml/2006/main" xmlns:r="http://schemas.openxmlformats.org/officeDocument/2006/relationships" xmlns:p="http://schemas.openxmlformats.org/presentationml/2006/main">
   <p:cSld>
     <p:spTree>
@@ -16335,181 +16675,7 @@
 </p:sld>
 </file>
 
-<file path=ppt/slides/slide3.xml><?xml version="1.0" encoding="utf-8"?>
-<p:sld xmlns:a="http://schemas.openxmlformats.org/drawingml/2006/main" xmlns:r="http://schemas.openxmlformats.org/officeDocument/2006/relationships" xmlns:p="http://schemas.openxmlformats.org/presentationml/2006/main">
-  <p:cSld>
-    <p:spTree>
-      <p:nvGrpSpPr>
-        <p:cNvPr id="1" name=""/>
-        <p:cNvGrpSpPr/>
-        <p:nvPr/>
-      </p:nvGrpSpPr>
-      <p:grpSpPr>
-        <a:xfrm>
-          <a:off x="0" y="0"/>
-          <a:ext cx="0" cy="0"/>
-          <a:chOff x="0" y="0"/>
-          <a:chExt cx="0" cy="0"/>
-        </a:xfrm>
-      </p:grpSpPr>
-      <p:sp>
-        <p:nvSpPr>
-          <p:cNvPr id="2" name="Title 1">
-            <a:extLst>
-              <a:ext uri="{FF2B5EF4-FFF2-40B4-BE49-F238E27FC236}">
-                <a16:creationId xmlns:a16="http://schemas.microsoft.com/office/drawing/2014/main" id="{37E876F8-067E-4EB9-BF49-F89978AAAAD0}"/>
-              </a:ext>
-            </a:extLst>
-          </p:cNvPr>
-          <p:cNvSpPr>
-            <a:spLocks noGrp="1"/>
-          </p:cNvSpPr>
-          <p:nvPr>
-            <p:ph type="title"/>
-          </p:nvPr>
-        </p:nvSpPr>
-        <p:spPr/>
-        <p:txBody>
-          <a:bodyPr/>
-          <a:lstStyle/>
-          <a:p>
-            <a:r>
-              <a:rPr lang="en-US" dirty="0"/>
-              <a:t>Content</a:t>
-            </a:r>
-          </a:p>
-        </p:txBody>
-      </p:sp>
-      <p:sp>
-        <p:nvSpPr>
-          <p:cNvPr id="3" name="Content Placeholder 2">
-            <a:extLst>
-              <a:ext uri="{FF2B5EF4-FFF2-40B4-BE49-F238E27FC236}">
-                <a16:creationId xmlns:a16="http://schemas.microsoft.com/office/drawing/2014/main" id="{1FF33A90-9C08-41D6-9E78-06E1318D0C4A}"/>
-              </a:ext>
-            </a:extLst>
-          </p:cNvPr>
-          <p:cNvSpPr>
-            <a:spLocks noGrp="1"/>
-          </p:cNvSpPr>
-          <p:nvPr>
-            <p:ph idx="1"/>
-          </p:nvPr>
-        </p:nvSpPr>
-        <p:spPr>
-          <a:xfrm>
-            <a:off x="628650" y="1825625"/>
-            <a:ext cx="7886700" cy="4506936"/>
-          </a:xfrm>
-        </p:spPr>
-        <p:txBody>
-          <a:bodyPr>
-            <a:normAutofit/>
-          </a:bodyPr>
-          <a:lstStyle/>
-          <a:p>
-            <a:pPr>
-              <a:lnSpc>
-                <a:spcPct val="130000"/>
-              </a:lnSpc>
-              <a:spcAft>
-                <a:spcPts val="200"/>
-              </a:spcAft>
-            </a:pPr>
-            <a:r>
-              <a:rPr lang="en-US" dirty="0"/>
-              <a:t>Adding Equations</a:t>
-            </a:r>
-          </a:p>
-          <a:p>
-            <a:pPr lvl="1"/>
-            <a:r>
-              <a:rPr lang="en-US" dirty="0"/>
-              <a:t>Image vs. Equation Editor</a:t>
-            </a:r>
-          </a:p>
-          <a:p>
-            <a:pPr lvl="1"/>
-            <a:r>
-              <a:rPr lang="en-US" dirty="0"/>
-              <a:t>Equation Editor: Point &amp; Click vs. Keyboard</a:t>
-            </a:r>
-          </a:p>
-          <a:p>
-            <a:r>
-              <a:rPr lang="en-US" dirty="0"/>
-              <a:t>Getting Started</a:t>
-            </a:r>
-          </a:p>
-          <a:p>
-            <a:pPr lvl="1"/>
-            <a:r>
-              <a:rPr lang="en-US" dirty="0"/>
-              <a:t>One more thing: Notations</a:t>
-            </a:r>
-          </a:p>
-          <a:p>
-            <a:pPr lvl="1"/>
-            <a:r>
-              <a:rPr lang="en-US" dirty="0"/>
-              <a:t>Let’s Do it</a:t>
-            </a:r>
-          </a:p>
-          <a:p>
-            <a:r>
-              <a:rPr lang="en-US" dirty="0"/>
-              <a:t>Formatting Equations</a:t>
-            </a:r>
-          </a:p>
-          <a:p>
-            <a:pPr lvl="1"/>
-            <a:r>
-              <a:rPr lang="en-US" dirty="0"/>
-              <a:t>Inline vs. Display</a:t>
-            </a:r>
-          </a:p>
-          <a:p>
-            <a:pPr lvl="1"/>
-            <a:r>
-              <a:rPr lang="en-US" dirty="0"/>
-              <a:t>Adding Space (Horizontal/Vertical) </a:t>
-            </a:r>
-          </a:p>
-          <a:p>
-            <a:pPr lvl="1"/>
-            <a:r>
-              <a:rPr lang="en-US" dirty="0"/>
-              <a:t>Align Equations</a:t>
-            </a:r>
-          </a:p>
-          <a:p>
-            <a:r>
-              <a:rPr lang="en-US" dirty="0"/>
-              <a:t>Referencing Equations</a:t>
-            </a:r>
-          </a:p>
-          <a:p>
-            <a:r>
-              <a:rPr lang="en-US" dirty="0"/>
-              <a:t>Extending your skills</a:t>
-            </a:r>
-          </a:p>
-        </p:txBody>
-      </p:sp>
-    </p:spTree>
-    <p:extLst>
-      <p:ext uri="{BB962C8B-B14F-4D97-AF65-F5344CB8AC3E}">
-        <p14:creationId xmlns:p14="http://schemas.microsoft.com/office/powerpoint/2010/main" val="2606373630"/>
-      </p:ext>
-    </p:extLst>
-  </p:cSld>
-  <p:clrMapOvr>
-    <a:masterClrMapping/>
-  </p:clrMapOvr>
-</p:sld>
-</file>
-
-<file path=ppt/slides/slide30.xml><?xml version="1.0" encoding="utf-8"?>
+<file path=ppt/slides/slide31.xml><?xml version="1.0" encoding="utf-8"?>
 <p:sld xmlns:a="http://schemas.openxmlformats.org/drawingml/2006/main" xmlns:r="http://schemas.openxmlformats.org/officeDocument/2006/relationships" xmlns:p="http://schemas.openxmlformats.org/presentationml/2006/main">
   <p:cSld>
     <p:spTree>
@@ -17794,8 +17960,8 @@
           </p:sp>
         </mc:Fallback>
       </mc:AlternateContent>
-      <mc:AlternateContent xmlns:mc="http://schemas.openxmlformats.org/markup-compatibility/2006">
-        <mc:Choice xmlns:a14="http://schemas.microsoft.com/office/drawing/2010/main" Requires="a14">
+      <mc:AlternateContent xmlns:mc="http://schemas.openxmlformats.org/markup-compatibility/2006" xmlns:a14="http://schemas.microsoft.com/office/drawing/2010/main">
+        <mc:Choice Requires="a14">
           <p:sp>
             <p:nvSpPr>
               <p:cNvPr id="5" name="Content Placeholder 4">
@@ -17903,7 +18069,7 @@
             </p:txBody>
           </p:sp>
         </mc:Choice>
-        <mc:Fallback>
+        <mc:Fallback xmlns="">
           <p:sp>
             <p:nvSpPr>
               <p:cNvPr id="5" name="Content Placeholder 4">
@@ -18845,8 +19011,8 @@
           </a:p>
         </p:txBody>
       </p:sp>
-      <mc:AlternateContent xmlns:mc="http://schemas.openxmlformats.org/markup-compatibility/2006">
-        <mc:Choice xmlns:a14="http://schemas.microsoft.com/office/drawing/2010/main" Requires="a14">
+      <mc:AlternateContent xmlns:mc="http://schemas.openxmlformats.org/markup-compatibility/2006" xmlns:a14="http://schemas.microsoft.com/office/drawing/2010/main">
+        <mc:Choice Requires="a14">
           <p:sp>
             <p:nvSpPr>
               <p:cNvPr id="4" name="Content Placeholder 3">
@@ -19140,7 +19306,7 @@
             </p:txBody>
           </p:sp>
         </mc:Choice>
-        <mc:Fallback>
+        <mc:Fallback xmlns="">
           <p:sp>
             <p:nvSpPr>
               <p:cNvPr id="4" name="Content Placeholder 3">

</xml_diff>